<commit_message>
updated powerpoint to include hammer.js to note new technology, started css formatting for mobile responsive
</commit_message>
<xml_diff>
--- a/assets/PuppyLove.pptx
+++ b/assets/PuppyLove.pptx
@@ -7483,7 +7483,43 @@
                 </a:gradFill>
                 <a:latin typeface="Corbel" panose="020B0503020204020204"/>
               </a:rPr>
-              <a:t>handlebars</a:t>
+              <a:t>Handlebars</a:t>
+            </a:r>
+          </a:p>
+          <a:p>
+            <a:pPr marL="514350" lvl="1" indent="-171450" defTabSz="685800">
+              <a:spcBef>
+                <a:spcPts val="375"/>
+              </a:spcBef>
+              <a:buClrTx/>
+            </a:pPr>
+            <a:r>
+              <a:rPr lang="en-US" sz="1500" dirty="0">
+                <a:gradFill>
+                  <a:gsLst>
+                    <a:gs pos="34000">
+                      <a:prstClr val="white">
+                        <a:lumMod val="93000"/>
+                      </a:prstClr>
+                    </a:gs>
+                    <a:gs pos="0">
+                      <a:prstClr val="black">
+                        <a:lumMod val="25000"/>
+                        <a:lumOff val="75000"/>
+                      </a:prstClr>
+                    </a:gs>
+                    <a:gs pos="100000">
+                      <a:srgbClr val="94D7E4">
+                        <a:lumMod val="0"/>
+                        <a:lumOff val="100000"/>
+                      </a:srgbClr>
+                    </a:gs>
+                  </a:gsLst>
+                  <a:lin ang="4800000" scaled="0"/>
+                </a:gradFill>
+                <a:latin typeface="Corbel" panose="020B0503020204020204"/>
+              </a:rPr>
+              <a:t>Hammer.js (new technology)</a:t>
             </a:r>
           </a:p>
           <a:p>

</xml_diff>